<commit_message>
Adding synthetic network traffic data
</commit_message>
<xml_diff>
--- a/network_data_kg.pptx
+++ b/network_data_kg.pptx
@@ -107,6 +107,11 @@
       </a:defRPr>
     </a:lvl9pPr>
   </p:defaultTextStyle>
+  <p:extLst>
+    <p:ext uri="{EFAFB233-063F-42B5-8137-9DF3F51BA10A}">
+      <p15:sldGuideLst xmlns:p15="http://schemas.microsoft.com/office/powerpoint/2012/main"/>
+    </p:ext>
+  </p:extLst>
 </p:presentation>
 </file>
 
@@ -257,7 +262,7 @@
           <a:p>
             <a:fld id="{F3B435F0-777B-FF4C-9A48-D6CFD8D1D448}" type="datetimeFigureOut">
               <a:rPr lang="en-US" smtClean="0"/>
-              <a:t>2/19/23</a:t>
+              <a:t>2/20/23</a:t>
             </a:fld>
             <a:endParaRPr lang="en-US"/>
           </a:p>
@@ -455,7 +460,7 @@
           <a:p>
             <a:fld id="{F3B435F0-777B-FF4C-9A48-D6CFD8D1D448}" type="datetimeFigureOut">
               <a:rPr lang="en-US" smtClean="0"/>
-              <a:t>2/19/23</a:t>
+              <a:t>2/20/23</a:t>
             </a:fld>
             <a:endParaRPr lang="en-US"/>
           </a:p>
@@ -663,7 +668,7 @@
           <a:p>
             <a:fld id="{F3B435F0-777B-FF4C-9A48-D6CFD8D1D448}" type="datetimeFigureOut">
               <a:rPr lang="en-US" smtClean="0"/>
-              <a:t>2/19/23</a:t>
+              <a:t>2/20/23</a:t>
             </a:fld>
             <a:endParaRPr lang="en-US"/>
           </a:p>
@@ -861,7 +866,7 @@
           <a:p>
             <a:fld id="{F3B435F0-777B-FF4C-9A48-D6CFD8D1D448}" type="datetimeFigureOut">
               <a:rPr lang="en-US" smtClean="0"/>
-              <a:t>2/19/23</a:t>
+              <a:t>2/20/23</a:t>
             </a:fld>
             <a:endParaRPr lang="en-US"/>
           </a:p>
@@ -1136,7 +1141,7 @@
           <a:p>
             <a:fld id="{F3B435F0-777B-FF4C-9A48-D6CFD8D1D448}" type="datetimeFigureOut">
               <a:rPr lang="en-US" smtClean="0"/>
-              <a:t>2/19/23</a:t>
+              <a:t>2/20/23</a:t>
             </a:fld>
             <a:endParaRPr lang="en-US"/>
           </a:p>
@@ -1401,7 +1406,7 @@
           <a:p>
             <a:fld id="{F3B435F0-777B-FF4C-9A48-D6CFD8D1D448}" type="datetimeFigureOut">
               <a:rPr lang="en-US" smtClean="0"/>
-              <a:t>2/19/23</a:t>
+              <a:t>2/20/23</a:t>
             </a:fld>
             <a:endParaRPr lang="en-US"/>
           </a:p>
@@ -1813,7 +1818,7 @@
           <a:p>
             <a:fld id="{F3B435F0-777B-FF4C-9A48-D6CFD8D1D448}" type="datetimeFigureOut">
               <a:rPr lang="en-US" smtClean="0"/>
-              <a:t>2/19/23</a:t>
+              <a:t>2/20/23</a:t>
             </a:fld>
             <a:endParaRPr lang="en-US"/>
           </a:p>
@@ -1954,7 +1959,7 @@
           <a:p>
             <a:fld id="{F3B435F0-777B-FF4C-9A48-D6CFD8D1D448}" type="datetimeFigureOut">
               <a:rPr lang="en-US" smtClean="0"/>
-              <a:t>2/19/23</a:t>
+              <a:t>2/20/23</a:t>
             </a:fld>
             <a:endParaRPr lang="en-US"/>
           </a:p>
@@ -2067,7 +2072,7 @@
           <a:p>
             <a:fld id="{F3B435F0-777B-FF4C-9A48-D6CFD8D1D448}" type="datetimeFigureOut">
               <a:rPr lang="en-US" smtClean="0"/>
-              <a:t>2/19/23</a:t>
+              <a:t>2/20/23</a:t>
             </a:fld>
             <a:endParaRPr lang="en-US"/>
           </a:p>
@@ -2378,7 +2383,7 @@
           <a:p>
             <a:fld id="{F3B435F0-777B-FF4C-9A48-D6CFD8D1D448}" type="datetimeFigureOut">
               <a:rPr lang="en-US" smtClean="0"/>
-              <a:t>2/19/23</a:t>
+              <a:t>2/20/23</a:t>
             </a:fld>
             <a:endParaRPr lang="en-US"/>
           </a:p>
@@ -2666,7 +2671,7 @@
           <a:p>
             <a:fld id="{F3B435F0-777B-FF4C-9A48-D6CFD8D1D448}" type="datetimeFigureOut">
               <a:rPr lang="en-US" smtClean="0"/>
-              <a:t>2/19/23</a:t>
+              <a:t>2/20/23</a:t>
             </a:fld>
             <a:endParaRPr lang="en-US"/>
           </a:p>
@@ -2907,7 +2912,7 @@
           <a:p>
             <a:fld id="{F3B435F0-777B-FF4C-9A48-D6CFD8D1D448}" type="datetimeFigureOut">
               <a:rPr lang="en-US" smtClean="0"/>
-              <a:t>2/19/23</a:t>
+              <a:t>2/20/23</a:t>
             </a:fld>
             <a:endParaRPr lang="en-US"/>
           </a:p>
@@ -4198,7 +4203,7 @@
           <p:nvPr>
             <p:extLst>
               <p:ext uri="{D42A27DB-BD31-4B8C-83A1-F6EECF244321}">
-                <p14:modId xmlns:p14="http://schemas.microsoft.com/office/powerpoint/2010/main" val="1979684827"/>
+                <p14:modId xmlns:p14="http://schemas.microsoft.com/office/powerpoint/2010/main" val="4057633192"/>
               </p:ext>
             </p:extLst>
           </p:nvPr>
@@ -4521,19 +4526,7 @@
                     <a:bodyPr/>
                     <a:lstStyle/>
                     <a:p>
-                      <a:endParaRPr lang="en-US" sz="1000" dirty="0">
-                        <a:latin typeface="+mn-lt"/>
-                      </a:endParaRPr>
-                    </a:p>
-                  </a:txBody>
-                  <a:tcPr/>
-                </a:tc>
-                <a:tc>
-                  <a:txBody>
-                    <a:bodyPr/>
-                    <a:lstStyle/>
-                    <a:p>
-                      <a:pPr marL="0" marR="0" lvl="0" indent="0" algn="l" defTabSz="914400" rtl="0" eaLnBrk="1" fontAlgn="b" latinLnBrk="0" hangingPunct="1">
+                      <a:pPr marL="0" marR="0" lvl="0" indent="0" algn="l" defTabSz="914400" rtl="0" eaLnBrk="1" fontAlgn="auto" latinLnBrk="0" hangingPunct="1">
                         <a:lnSpc>
                           <a:spcPct val="100000"/>
                         </a:lnSpc>
@@ -4551,40 +4544,6 @@
                         <a:defRPr/>
                       </a:pPr>
                       <a:r>
-                        <a:rPr kumimoji="0" lang="en-US" sz="1000" b="0" i="0" u="none" strike="noStrike" kern="1200" cap="none" spc="0" normalizeH="0" baseline="0" noProof="0" dirty="0">
-                          <a:ln>
-                            <a:noFill/>
-                          </a:ln>
-                          <a:solidFill>
-                            <a:srgbClr val="000000"/>
-                          </a:solidFill>
-                          <a:effectLst/>
-                          <a:uLnTx/>
-                          <a:uFillTx/>
-                          <a:latin typeface="+mn-lt"/>
-                          <a:ea typeface="+mn-ea"/>
-                          <a:cs typeface="+mn-cs"/>
-                        </a:rPr>
-                        <a:t>DNS Query</a:t>
-                      </a:r>
-                    </a:p>
-                  </a:txBody>
-                  <a:tcPr/>
-                </a:tc>
-                <a:extLst>
-                  <a:ext uri="{0D108BD9-81ED-4DB2-BD59-A6C34878D82A}">
-                    <a16:rowId xmlns:a16="http://schemas.microsoft.com/office/drawing/2014/main" val="3112961027"/>
-                  </a:ext>
-                </a:extLst>
-              </a:tr>
-              <a:tr h="370840">
-                <a:tc>
-                  <a:txBody>
-                    <a:bodyPr/>
-                    <a:lstStyle/>
-                    <a:p>
-                      <a:pPr algn="l" fontAlgn="b"/>
-                      <a:r>
                         <a:rPr lang="en-US" sz="1000" b="0" i="0" u="none" strike="noStrike" dirty="0">
                           <a:solidFill>
                             <a:srgbClr val="000000"/>
@@ -4596,65 +4555,14 @@
                       </a:r>
                     </a:p>
                   </a:txBody>
-                  <a:tcPr marL="9525" marR="9525" marT="9525" marB="0" anchor="b"/>
-                </a:tc>
-                <a:tc>
-                  <a:txBody>
-                    <a:bodyPr/>
-                    <a:lstStyle/>
-                    <a:p>
-                      <a:endParaRPr lang="en-US" sz="1000">
-                        <a:latin typeface="+mn-lt"/>
-                      </a:endParaRPr>
-                    </a:p>
-                  </a:txBody>
-                  <a:tcPr/>
-                </a:tc>
-                <a:tc>
-                  <a:txBody>
-                    <a:bodyPr/>
-                    <a:lstStyle/>
-                    <a:p>
-                      <a:endParaRPr lang="en-US" sz="1000">
-                        <a:latin typeface="+mn-lt"/>
-                      </a:endParaRPr>
-                    </a:p>
-                  </a:txBody>
-                  <a:tcPr/>
-                </a:tc>
-                <a:extLst>
-                  <a:ext uri="{0D108BD9-81ED-4DB2-BD59-A6C34878D82A}">
-                    <a16:rowId xmlns:a16="http://schemas.microsoft.com/office/drawing/2014/main" val="1051418331"/>
-                  </a:ext>
-                </a:extLst>
-              </a:tr>
-              <a:tr h="370840">
-                <a:tc>
-                  <a:txBody>
-                    <a:bodyPr/>
-                    <a:lstStyle/>
-                    <a:p>
-                      <a:pPr algn="l" fontAlgn="b"/>
-                      <a:r>
-                        <a:rPr lang="en-US" sz="1000" b="0" i="0" u="none" strike="noStrike" dirty="0">
-                          <a:solidFill>
-                            <a:srgbClr val="000000"/>
-                          </a:solidFill>
-                          <a:effectLst/>
-                          <a:latin typeface="+mn-lt"/>
-                        </a:rPr>
-                        <a:t>TCP CAM ACK</a:t>
-                      </a:r>
-                    </a:p>
-                  </a:txBody>
-                  <a:tcPr marL="9525" marR="9525" marT="9525" marB="0" anchor="b"/>
-                </a:tc>
-                <a:tc>
-                  <a:txBody>
-                    <a:bodyPr/>
-                    <a:lstStyle/>
-                    <a:p>
-                      <a:pPr marL="0" marR="0" lvl="0" indent="0" algn="l" defTabSz="914400" rtl="0" eaLnBrk="1" fontAlgn="auto" latinLnBrk="0" hangingPunct="1">
+                  <a:tcPr/>
+                </a:tc>
+                <a:tc>
+                  <a:txBody>
+                    <a:bodyPr/>
+                    <a:lstStyle/>
+                    <a:p>
+                      <a:pPr marL="0" marR="0" lvl="0" indent="0" algn="l" defTabSz="914400" rtl="0" eaLnBrk="1" fontAlgn="b" latinLnBrk="0" hangingPunct="1">
                         <a:lnSpc>
                           <a:spcPct val="100000"/>
                         </a:lnSpc>
@@ -4672,34 +4580,21 @@
                         <a:defRPr/>
                       </a:pPr>
                       <a:r>
-                        <a:rPr lang="en-US" sz="1000" b="0" i="0" u="none" strike="noStrike" dirty="0">
-                          <a:solidFill>
-                            <a:srgbClr val="000000"/>
-                          </a:solidFill>
-                          <a:effectLst/>
-                          <a:latin typeface="+mn-lt"/>
-                        </a:rPr>
-                        <a:t>TCP CAM Duplicate ACK</a:t>
-                      </a:r>
-                    </a:p>
-                  </a:txBody>
-                  <a:tcPr/>
-                </a:tc>
-                <a:tc>
-                  <a:txBody>
-                    <a:bodyPr/>
-                    <a:lstStyle/>
-                    <a:p>
-                      <a:pPr algn="l" fontAlgn="b"/>
-                      <a:r>
-                        <a:rPr lang="en-US" sz="1000" b="0" i="0" u="none" strike="noStrike" dirty="0">
-                          <a:solidFill>
-                            <a:srgbClr val="000000"/>
-                          </a:solidFill>
-                          <a:effectLst/>
-                          <a:latin typeface="+mn-lt"/>
-                        </a:rPr>
-                        <a:t>TCP SYN ACK</a:t>
+                        <a:rPr kumimoji="0" lang="en-US" sz="1000" b="0" i="0" u="none" strike="noStrike" kern="1200" cap="none" spc="0" normalizeH="0" baseline="0" noProof="0" dirty="0">
+                          <a:ln>
+                            <a:noFill/>
+                          </a:ln>
+                          <a:solidFill>
+                            <a:srgbClr val="000000"/>
+                          </a:solidFill>
+                          <a:effectLst/>
+                          <a:uLnTx/>
+                          <a:uFillTx/>
+                          <a:latin typeface="+mn-lt"/>
+                          <a:ea typeface="+mn-ea"/>
+                          <a:cs typeface="+mn-cs"/>
+                        </a:rPr>
+                        <a:t>DNS Query</a:t>
                       </a:r>
                     </a:p>
                   </a:txBody>
@@ -4707,7 +4602,7 @@
                 </a:tc>
                 <a:extLst>
                   <a:ext uri="{0D108BD9-81ED-4DB2-BD59-A6C34878D82A}">
-                    <a16:rowId xmlns:a16="http://schemas.microsoft.com/office/drawing/2014/main" val="3395804546"/>
+                    <a16:rowId xmlns:a16="http://schemas.microsoft.com/office/drawing/2014/main" val="3112961027"/>
                   </a:ext>
                 </a:extLst>
               </a:tr>
@@ -4726,7 +4621,7 @@
                           <a:effectLst/>
                           <a:latin typeface="+mn-lt"/>
                         </a:rPr>
-                        <a:t>TCP CAM Duplicate ACK</a:t>
+                        <a:t>ICMP TTL</a:t>
                       </a:r>
                     </a:p>
                   </a:txBody>
@@ -4762,18 +4657,57 @@
                           <a:effectLst/>
                           <a:latin typeface="+mn-lt"/>
                         </a:rPr>
-                        <a:t>TCP Retransmission</a:t>
-                      </a:r>
-                    </a:p>
-                  </a:txBody>
-                  <a:tcPr/>
-                </a:tc>
-                <a:tc>
-                  <a:txBody>
-                    <a:bodyPr/>
-                    <a:lstStyle/>
-                    <a:p>
-                      <a:pPr marL="0" marR="0" lvl="0" indent="0" algn="l" defTabSz="914400" rtl="0" eaLnBrk="1" fontAlgn="b" latinLnBrk="0" hangingPunct="1">
+                        <a:t>ICMP Redirect</a:t>
+                      </a:r>
+                    </a:p>
+                  </a:txBody>
+                  <a:tcPr/>
+                </a:tc>
+                <a:tc>
+                  <a:txBody>
+                    <a:bodyPr/>
+                    <a:lstStyle/>
+                    <a:p>
+                      <a:endParaRPr lang="en-US" sz="1000">
+                        <a:latin typeface="+mn-lt"/>
+                      </a:endParaRPr>
+                    </a:p>
+                  </a:txBody>
+                  <a:tcPr/>
+                </a:tc>
+                <a:extLst>
+                  <a:ext uri="{0D108BD9-81ED-4DB2-BD59-A6C34878D82A}">
+                    <a16:rowId xmlns:a16="http://schemas.microsoft.com/office/drawing/2014/main" val="1051418331"/>
+                  </a:ext>
+                </a:extLst>
+              </a:tr>
+              <a:tr h="370840">
+                <a:tc>
+                  <a:txBody>
+                    <a:bodyPr/>
+                    <a:lstStyle/>
+                    <a:p>
+                      <a:pPr algn="l" fontAlgn="b"/>
+                      <a:r>
+                        <a:rPr lang="en-US" sz="1000" b="0" i="0" u="none" strike="noStrike" dirty="0">
+                          <a:solidFill>
+                            <a:srgbClr val="000000"/>
+                          </a:solidFill>
+                          <a:effectLst/>
+                          <a:latin typeface="+mn-lt"/>
+                        </a:rPr>
+                        <a:t>TCP CAM ACK</a:t>
+                      </a:r>
+                    </a:p>
+                  </a:txBody>
+                  <a:tcPr marL="9525" marR="9525" marT="9525" marB="0" anchor="b"/>
+                </a:tc>
+                <a:tc>
+                  <a:txBody>
+                    <a:bodyPr/>
+                    <a:lstStyle/>
+                    <a:p>
+                      <a:pPr marL="0" marR="0" lvl="0" indent="0" algn="l" defTabSz="914400" rtl="0" eaLnBrk="1" fontAlgn="auto" latinLnBrk="0" hangingPunct="1">
                         <a:lnSpc>
                           <a:spcPct val="100000"/>
                         </a:lnSpc>
@@ -4791,21 +4725,34 @@
                         <a:defRPr/>
                       </a:pPr>
                       <a:r>
-                        <a:rPr kumimoji="0" lang="en-US" sz="1000" b="0" i="0" u="none" strike="noStrike" kern="1200" cap="none" spc="0" normalizeH="0" baseline="0" noProof="0" dirty="0">
-                          <a:ln>
-                            <a:noFill/>
-                          </a:ln>
-                          <a:solidFill>
-                            <a:srgbClr val="000000"/>
-                          </a:solidFill>
-                          <a:effectLst/>
-                          <a:uLnTx/>
-                          <a:uFillTx/>
-                          <a:latin typeface="+mn-lt"/>
-                          <a:ea typeface="+mn-ea"/>
-                          <a:cs typeface="+mn-cs"/>
-                        </a:rPr>
-                        <a:t>TCP CAM ACK</a:t>
+                        <a:rPr lang="en-US" sz="1000" b="0" i="0" u="none" strike="noStrike" dirty="0">
+                          <a:solidFill>
+                            <a:srgbClr val="000000"/>
+                          </a:solidFill>
+                          <a:effectLst/>
+                          <a:latin typeface="+mn-lt"/>
+                        </a:rPr>
+                        <a:t>TCP CAM Duplicate ACK, TLS Client Hello</a:t>
+                      </a:r>
+                    </a:p>
+                  </a:txBody>
+                  <a:tcPr/>
+                </a:tc>
+                <a:tc>
+                  <a:txBody>
+                    <a:bodyPr/>
+                    <a:lstStyle/>
+                    <a:p>
+                      <a:pPr algn="l" fontAlgn="b"/>
+                      <a:r>
+                        <a:rPr lang="en-US" sz="1000" b="0" i="0" u="none" strike="noStrike" dirty="0">
+                          <a:solidFill>
+                            <a:srgbClr val="000000"/>
+                          </a:solidFill>
+                          <a:effectLst/>
+                          <a:latin typeface="+mn-lt"/>
+                        </a:rPr>
+                        <a:t>TCP SYN ACK</a:t>
                       </a:r>
                     </a:p>
                   </a:txBody>
@@ -4813,7 +4760,7 @@
                 </a:tc>
                 <a:extLst>
                   <a:ext uri="{0D108BD9-81ED-4DB2-BD59-A6C34878D82A}">
-                    <a16:rowId xmlns:a16="http://schemas.microsoft.com/office/drawing/2014/main" val="4028856636"/>
+                    <a16:rowId xmlns:a16="http://schemas.microsoft.com/office/drawing/2014/main" val="3395804546"/>
                   </a:ext>
                 </a:extLst>
               </a:tr>
@@ -4825,14 +4772,14 @@
                     <a:p>
                       <a:pPr algn="l" fontAlgn="b"/>
                       <a:r>
-                        <a:rPr lang="en-US" sz="1000" b="0" i="0" u="none" strike="noStrike">
-                          <a:solidFill>
-                            <a:srgbClr val="000000"/>
-                          </a:solidFill>
-                          <a:effectLst/>
-                          <a:latin typeface="+mn-lt"/>
-                        </a:rPr>
-                        <a:t>TCP CAM PSH ACK</a:t>
+                        <a:rPr lang="en-US" sz="1000" b="0" i="0" u="none" strike="noStrike" dirty="0">
+                          <a:solidFill>
+                            <a:srgbClr val="000000"/>
+                          </a:solidFill>
+                          <a:effectLst/>
+                          <a:latin typeface="+mn-lt"/>
+                        </a:rPr>
+                        <a:t>TCP CAM Duplicate ACK</a:t>
                       </a:r>
                     </a:p>
                   </a:txBody>
@@ -4868,7 +4815,7 @@
                           <a:effectLst/>
                           <a:latin typeface="+mn-lt"/>
                         </a:rPr>
-                        <a:t>TCP PSH Retransmission, TCP PSH Window Full Retransmission</a:t>
+                        <a:t>TCP Retransmission</a:t>
                       </a:r>
                     </a:p>
                   </a:txBody>
@@ -4919,7 +4866,7 @@
                 </a:tc>
                 <a:extLst>
                   <a:ext uri="{0D108BD9-81ED-4DB2-BD59-A6C34878D82A}">
-                    <a16:rowId xmlns:a16="http://schemas.microsoft.com/office/drawing/2014/main" val="3790256144"/>
+                    <a16:rowId xmlns:a16="http://schemas.microsoft.com/office/drawing/2014/main" val="4028856636"/>
                   </a:ext>
                 </a:extLst>
               </a:tr>
@@ -4938,7 +4885,7 @@
                           <a:effectLst/>
                           <a:latin typeface="+mn-lt"/>
                         </a:rPr>
-                        <a:t>TCP DOM ACK</a:t>
+                        <a:t>TCP CAM PSH ACK</a:t>
                       </a:r>
                     </a:p>
                   </a:txBody>
@@ -4974,7 +4921,7 @@
                           <a:effectLst/>
                           <a:latin typeface="+mn-lt"/>
                         </a:rPr>
-                        <a:t>TCP DOM Duplicate ACK</a:t>
+                        <a:t>TCP PSH Retransmission, TCP PSH Window Full Retransmission</a:t>
                       </a:r>
                     </a:p>
                   </a:txBody>
@@ -5017,6 +4964,112 @@
                           <a:ea typeface="+mn-ea"/>
                           <a:cs typeface="+mn-cs"/>
                         </a:rPr>
+                        <a:t>TCP CAM ACK</a:t>
+                      </a:r>
+                    </a:p>
+                  </a:txBody>
+                  <a:tcPr/>
+                </a:tc>
+                <a:extLst>
+                  <a:ext uri="{0D108BD9-81ED-4DB2-BD59-A6C34878D82A}">
+                    <a16:rowId xmlns:a16="http://schemas.microsoft.com/office/drawing/2014/main" val="3790256144"/>
+                  </a:ext>
+                </a:extLst>
+              </a:tr>
+              <a:tr h="370840">
+                <a:tc>
+                  <a:txBody>
+                    <a:bodyPr/>
+                    <a:lstStyle/>
+                    <a:p>
+                      <a:pPr algn="l" fontAlgn="b"/>
+                      <a:r>
+                        <a:rPr lang="en-US" sz="1000" b="0" i="0" u="none" strike="noStrike" dirty="0">
+                          <a:solidFill>
+                            <a:srgbClr val="000000"/>
+                          </a:solidFill>
+                          <a:effectLst/>
+                          <a:latin typeface="+mn-lt"/>
+                        </a:rPr>
+                        <a:t>TCP DOM ACK</a:t>
+                      </a:r>
+                    </a:p>
+                  </a:txBody>
+                  <a:tcPr marL="9525" marR="9525" marT="9525" marB="0" anchor="b"/>
+                </a:tc>
+                <a:tc>
+                  <a:txBody>
+                    <a:bodyPr/>
+                    <a:lstStyle/>
+                    <a:p>
+                      <a:pPr marL="0" marR="0" lvl="0" indent="0" algn="l" defTabSz="914400" rtl="0" eaLnBrk="1" fontAlgn="auto" latinLnBrk="0" hangingPunct="1">
+                        <a:lnSpc>
+                          <a:spcPct val="100000"/>
+                        </a:lnSpc>
+                        <a:spcBef>
+                          <a:spcPts val="0"/>
+                        </a:spcBef>
+                        <a:spcAft>
+                          <a:spcPts val="0"/>
+                        </a:spcAft>
+                        <a:buClrTx/>
+                        <a:buSzTx/>
+                        <a:buFontTx/>
+                        <a:buNone/>
+                        <a:tabLst/>
+                        <a:defRPr/>
+                      </a:pPr>
+                      <a:r>
+                        <a:rPr lang="en-US" sz="1000" b="0" i="0" u="none" strike="noStrike" dirty="0">
+                          <a:solidFill>
+                            <a:srgbClr val="000000"/>
+                          </a:solidFill>
+                          <a:effectLst/>
+                          <a:latin typeface="+mn-lt"/>
+                        </a:rPr>
+                        <a:t>TCP DOM Duplicate ACK</a:t>
+                      </a:r>
+                    </a:p>
+                  </a:txBody>
+                  <a:tcPr/>
+                </a:tc>
+                <a:tc>
+                  <a:txBody>
+                    <a:bodyPr/>
+                    <a:lstStyle/>
+                    <a:p>
+                      <a:pPr marL="0" marR="0" lvl="0" indent="0" algn="l" defTabSz="914400" rtl="0" eaLnBrk="1" fontAlgn="b" latinLnBrk="0" hangingPunct="1">
+                        <a:lnSpc>
+                          <a:spcPct val="100000"/>
+                        </a:lnSpc>
+                        <a:spcBef>
+                          <a:spcPts val="0"/>
+                        </a:spcBef>
+                        <a:spcAft>
+                          <a:spcPts val="0"/>
+                        </a:spcAft>
+                        <a:buClrTx/>
+                        <a:buSzTx/>
+                        <a:buFontTx/>
+                        <a:buNone/>
+                        <a:tabLst/>
+                        <a:defRPr/>
+                      </a:pPr>
+                      <a:r>
+                        <a:rPr kumimoji="0" lang="en-US" sz="1000" b="0" i="0" u="none" strike="noStrike" kern="1200" cap="none" spc="0" normalizeH="0" baseline="0" noProof="0" dirty="0">
+                          <a:ln>
+                            <a:noFill/>
+                          </a:ln>
+                          <a:solidFill>
+                            <a:srgbClr val="000000"/>
+                          </a:solidFill>
+                          <a:effectLst/>
+                          <a:uLnTx/>
+                          <a:uFillTx/>
+                          <a:latin typeface="+mn-lt"/>
+                          <a:ea typeface="+mn-ea"/>
+                          <a:cs typeface="+mn-cs"/>
+                        </a:rPr>
                         <a:t>TCP SYN ACK</a:t>
                       </a:r>
                     </a:p>
@@ -5055,7 +5108,28 @@
                     <a:bodyPr/>
                     <a:lstStyle/>
                     <a:p>
-                      <a:endParaRPr lang="en-US" sz="1000" dirty="0">
+                      <a:pPr marL="0" marR="0" lvl="0" indent="0" algn="l" defTabSz="914400" rtl="0" eaLnBrk="1" fontAlgn="auto" latinLnBrk="0" hangingPunct="1">
+                        <a:lnSpc>
+                          <a:spcPct val="100000"/>
+                        </a:lnSpc>
+                        <a:spcBef>
+                          <a:spcPts val="0"/>
+                        </a:spcBef>
+                        <a:spcAft>
+                          <a:spcPts val="0"/>
+                        </a:spcAft>
+                        <a:buClrTx/>
+                        <a:buSzTx/>
+                        <a:buFontTx/>
+                        <a:buNone/>
+                        <a:tabLst/>
+                        <a:defRPr/>
+                      </a:pPr>
+                      <a:endParaRPr lang="en-US" sz="1000" b="0" i="0" u="none" strike="noStrike" dirty="0">
+                        <a:solidFill>
+                          <a:srgbClr val="000000"/>
+                        </a:solidFill>
+                        <a:effectLst/>
                         <a:latin typeface="+mn-lt"/>
                       </a:endParaRPr>
                     </a:p>
@@ -5844,14 +5918,14 @@
           <p:nvPr>
             <p:extLst>
               <p:ext uri="{D42A27DB-BD31-4B8C-83A1-F6EECF244321}">
-                <p14:modId xmlns:p14="http://schemas.microsoft.com/office/powerpoint/2010/main" val="4187161907"/>
+                <p14:modId xmlns:p14="http://schemas.microsoft.com/office/powerpoint/2010/main" val="306408176"/>
               </p:ext>
             </p:extLst>
           </p:nvPr>
         </p:nvGraphicFramePr>
         <p:xfrm>
           <a:off x="557214" y="242887"/>
-          <a:ext cx="11415711" cy="6474464"/>
+          <a:ext cx="11415711" cy="6592708"/>
         </p:xfrm>
         <a:graphic>
           <a:graphicData uri="http://schemas.openxmlformats.org/drawingml/2006/table">
@@ -5960,22 +6034,7 @@
                     <a:bodyPr/>
                     <a:lstStyle/>
                     <a:p>
-                      <a:r>
-                        <a:rPr lang="en-US" sz="900" dirty="0">
-                          <a:latin typeface="+mn-lt"/>
-                        </a:rPr>
-                        <a:t>TCP ACK</a:t>
-                      </a:r>
-                    </a:p>
-                  </a:txBody>
-                  <a:tcPr/>
-                </a:tc>
-                <a:tc>
-                  <a:txBody>
-                    <a:bodyPr/>
-                    <a:lstStyle/>
-                    <a:p>
-                      <a:pPr marL="0" marR="0" lvl="0" indent="0" algn="l" defTabSz="914400" rtl="0" eaLnBrk="1" fontAlgn="b" latinLnBrk="0" hangingPunct="1">
+                      <a:pPr marL="0" marR="0" lvl="0" indent="0" algn="l" defTabSz="914400" rtl="0" eaLnBrk="1" fontAlgn="auto" latinLnBrk="0" hangingPunct="1">
                         <a:lnSpc>
                           <a:spcPct val="100000"/>
                         </a:lnSpc>
@@ -5993,39 +6052,11 @@
                         <a:defRPr/>
                       </a:pPr>
                       <a:r>
-                        <a:rPr kumimoji="0" lang="en-US" sz="900" b="0" i="0" u="none" strike="noStrike" kern="1200" cap="none" spc="0" normalizeH="0" baseline="0" noProof="0" dirty="0">
-                          <a:ln>
-                            <a:noFill/>
-                          </a:ln>
-                          <a:solidFill>
-                            <a:srgbClr val="000000"/>
-                          </a:solidFill>
-                          <a:effectLst/>
-                          <a:uLnTx/>
-                          <a:uFillTx/>
-                          <a:latin typeface="+mn-lt"/>
-                          <a:ea typeface="+mn-ea"/>
-                          <a:cs typeface="+mn-cs"/>
-                        </a:rPr>
-                        <a:t>TCP SYN</a:t>
-                      </a:r>
-                    </a:p>
-                  </a:txBody>
-                  <a:tcPr/>
-                </a:tc>
-                <a:extLst>
-                  <a:ext uri="{0D108BD9-81ED-4DB2-BD59-A6C34878D82A}">
-                    <a16:rowId xmlns:a16="http://schemas.microsoft.com/office/drawing/2014/main" val="408474474"/>
-                  </a:ext>
-                </a:extLst>
-              </a:tr>
-              <a:tr h="358934">
-                <a:tc>
-                  <a:txBody>
-                    <a:bodyPr/>
-                    <a:lstStyle/>
-                    <a:p>
-                      <a:pPr algn="l" fontAlgn="b"/>
+                        <a:rPr lang="en-US" sz="900" dirty="0">
+                          <a:latin typeface="+mn-lt"/>
+                        </a:rPr>
+                        <a:t>TCP CAM ACK, </a:t>
+                      </a:r>
                       <a:r>
                         <a:rPr lang="en-US" sz="900" b="0" i="0" u="none" strike="noStrike" dirty="0">
                           <a:solidFill>
@@ -6034,180 +6065,18 @@
                           <a:effectLst/>
                           <a:latin typeface="+mn-lt"/>
                         </a:rPr>
-                        <a:t>TCP Uncaptured</a:t>
-                      </a:r>
-                    </a:p>
-                  </a:txBody>
-                  <a:tcPr marL="9525" marR="9525" marT="9525" marB="0" anchor="b"/>
-                </a:tc>
-                <a:tc>
-                  <a:txBody>
-                    <a:bodyPr/>
-                    <a:lstStyle/>
-                    <a:p>
-                      <a:endParaRPr lang="en-US" sz="900">
-                        <a:latin typeface="+mn-lt"/>
-                      </a:endParaRPr>
-                    </a:p>
-                  </a:txBody>
-                  <a:tcPr/>
-                </a:tc>
-                <a:tc>
-                  <a:txBody>
-                    <a:bodyPr/>
-                    <a:lstStyle/>
-                    <a:p>
-                      <a:r>
-                        <a:rPr lang="en-US" sz="900" dirty="0">
-                          <a:latin typeface="+mn-lt"/>
-                        </a:rPr>
-                        <a:t>TCP ACK</a:t>
-                      </a:r>
-                    </a:p>
-                  </a:txBody>
-                  <a:tcPr/>
-                </a:tc>
-                <a:extLst>
-                  <a:ext uri="{0D108BD9-81ED-4DB2-BD59-A6C34878D82A}">
-                    <a16:rowId xmlns:a16="http://schemas.microsoft.com/office/drawing/2014/main" val="1264549328"/>
-                  </a:ext>
-                </a:extLst>
-              </a:tr>
-              <a:tr h="358934">
-                <a:tc>
-                  <a:txBody>
-                    <a:bodyPr/>
-                    <a:lstStyle/>
-                    <a:p>
-                      <a:pPr algn="l" fontAlgn="b"/>
-                      <a:r>
-                        <a:rPr lang="en-US" sz="900" b="0" i="0" u="none" strike="noStrike" dirty="0">
-                          <a:solidFill>
-                            <a:srgbClr val="000000"/>
-                          </a:solidFill>
-                          <a:effectLst/>
-                          <a:latin typeface="+mn-lt"/>
-                        </a:rPr>
-                        <a:t>TCP unseen segment</a:t>
-                      </a:r>
-                    </a:p>
-                  </a:txBody>
-                  <a:tcPr marL="9525" marR="9525" marT="9525" marB="0" anchor="b"/>
-                </a:tc>
-                <a:tc>
-                  <a:txBody>
-                    <a:bodyPr/>
-                    <a:lstStyle/>
-                    <a:p>
-                      <a:endParaRPr lang="en-US" sz="900">
-                        <a:latin typeface="+mn-lt"/>
-                      </a:endParaRPr>
-                    </a:p>
-                  </a:txBody>
-                  <a:tcPr/>
-                </a:tc>
-                <a:tc>
-                  <a:txBody>
-                    <a:bodyPr/>
-                    <a:lstStyle/>
-                    <a:p>
-                      <a:r>
-                        <a:rPr lang="en-US" sz="900" dirty="0">
-                          <a:latin typeface="+mn-lt"/>
-                        </a:rPr>
-                        <a:t>TCP ACK</a:t>
-                      </a:r>
-                    </a:p>
-                  </a:txBody>
-                  <a:tcPr/>
-                </a:tc>
-                <a:extLst>
-                  <a:ext uri="{0D108BD9-81ED-4DB2-BD59-A6C34878D82A}">
-                    <a16:rowId xmlns:a16="http://schemas.microsoft.com/office/drawing/2014/main" val="823013732"/>
-                  </a:ext>
-                </a:extLst>
-              </a:tr>
-              <a:tr h="358934">
-                <a:tc>
-                  <a:txBody>
-                    <a:bodyPr/>
-                    <a:lstStyle/>
-                    <a:p>
-                      <a:pPr algn="l" fontAlgn="b"/>
-                      <a:r>
-                        <a:rPr lang="en-US" sz="900" b="0" i="0" u="none" strike="noStrike" dirty="0">
-                          <a:solidFill>
-                            <a:srgbClr val="000000"/>
-                          </a:solidFill>
-                          <a:effectLst/>
-                          <a:latin typeface="+mn-lt"/>
-                        </a:rPr>
-                        <a:t>TCP Window Update</a:t>
-                      </a:r>
-                    </a:p>
-                  </a:txBody>
-                  <a:tcPr marL="9525" marR="9525" marT="9525" marB="0" anchor="b"/>
-                </a:tc>
-                <a:tc>
-                  <a:txBody>
-                    <a:bodyPr/>
-                    <a:lstStyle/>
-                    <a:p>
-                      <a:endParaRPr lang="en-US" sz="900" dirty="0">
-                        <a:latin typeface="+mn-lt"/>
-                      </a:endParaRPr>
-                    </a:p>
-                  </a:txBody>
-                  <a:tcPr/>
-                </a:tc>
-                <a:tc>
-                  <a:txBody>
-                    <a:bodyPr/>
-                    <a:lstStyle/>
-                    <a:p>
-                      <a:r>
-                        <a:rPr lang="en-US" sz="900" dirty="0">
-                          <a:latin typeface="+mn-lt"/>
-                        </a:rPr>
-                        <a:t>TCP ACK</a:t>
-                      </a:r>
-                    </a:p>
-                  </a:txBody>
-                  <a:tcPr/>
-                </a:tc>
-                <a:extLst>
-                  <a:ext uri="{0D108BD9-81ED-4DB2-BD59-A6C34878D82A}">
-                    <a16:rowId xmlns:a16="http://schemas.microsoft.com/office/drawing/2014/main" val="3147046320"/>
-                  </a:ext>
-                </a:extLst>
-              </a:tr>
-              <a:tr h="358934">
-                <a:tc>
-                  <a:txBody>
-                    <a:bodyPr/>
-                    <a:lstStyle/>
-                    <a:p>
-                      <a:pPr algn="l" fontAlgn="b"/>
-                      <a:r>
-                        <a:rPr lang="en-US" sz="900" b="0" i="0" u="none" strike="noStrike" dirty="0">
-                          <a:solidFill>
-                            <a:srgbClr val="000000"/>
-                          </a:solidFill>
-                          <a:effectLst/>
-                          <a:latin typeface="+mn-lt"/>
-                        </a:rPr>
-                        <a:t>TLS Application Data</a:t>
-                      </a:r>
-                    </a:p>
-                  </a:txBody>
-                  <a:tcPr marL="9525" marR="9525" marT="9525" marB="0" anchor="b"/>
-                </a:tc>
-                <a:tc>
-                  <a:txBody>
-                    <a:bodyPr/>
-                    <a:lstStyle/>
-                    <a:p>
-                      <a:pPr marL="0" marR="0" lvl="0" indent="0" algn="l" defTabSz="914400" rtl="0" eaLnBrk="1" fontAlgn="auto" latinLnBrk="0" hangingPunct="1">
+                        <a:t>TCP DOM ACK, TCP DOM PSH ACK</a:t>
+                      </a:r>
+                    </a:p>
+                  </a:txBody>
+                  <a:tcPr/>
+                </a:tc>
+                <a:tc>
+                  <a:txBody>
+                    <a:bodyPr/>
+                    <a:lstStyle/>
+                    <a:p>
+                      <a:pPr marL="0" marR="0" lvl="0" indent="0" algn="l" defTabSz="914400" rtl="0" eaLnBrk="1" fontAlgn="b" latinLnBrk="0" hangingPunct="1">
                         <a:lnSpc>
                           <a:spcPct val="100000"/>
                         </a:lnSpc>
@@ -6225,6 +6094,40 @@
                         <a:defRPr/>
                       </a:pPr>
                       <a:r>
+                        <a:rPr kumimoji="0" lang="en-US" sz="900" b="0" i="0" u="none" strike="noStrike" kern="1200" cap="none" spc="0" normalizeH="0" baseline="0" noProof="0" dirty="0">
+                          <a:ln>
+                            <a:noFill/>
+                          </a:ln>
+                          <a:solidFill>
+                            <a:srgbClr val="000000"/>
+                          </a:solidFill>
+                          <a:effectLst/>
+                          <a:uLnTx/>
+                          <a:uFillTx/>
+                          <a:latin typeface="+mn-lt"/>
+                          <a:ea typeface="+mn-ea"/>
+                          <a:cs typeface="+mn-cs"/>
+                        </a:rPr>
+                        <a:t>TCP SYN</a:t>
+                      </a:r>
+                    </a:p>
+                  </a:txBody>
+                  <a:tcPr/>
+                </a:tc>
+                <a:extLst>
+                  <a:ext uri="{0D108BD9-81ED-4DB2-BD59-A6C34878D82A}">
+                    <a16:rowId xmlns:a16="http://schemas.microsoft.com/office/drawing/2014/main" val="408474474"/>
+                  </a:ext>
+                </a:extLst>
+              </a:tr>
+              <a:tr h="358934">
+                <a:tc>
+                  <a:txBody>
+                    <a:bodyPr/>
+                    <a:lstStyle/>
+                    <a:p>
+                      <a:pPr algn="l" fontAlgn="b"/>
+                      <a:r>
                         <a:rPr lang="en-US" sz="900" b="0" i="0" u="none" strike="noStrike" dirty="0">
                           <a:solidFill>
                             <a:srgbClr val="000000"/>
@@ -6232,9 +6135,178 @@
                           <a:effectLst/>
                           <a:latin typeface="+mn-lt"/>
                         </a:rPr>
-                        <a:t>TLS Encrypted Alert, TLS Uncaptured</a:t>
-                      </a:r>
-                    </a:p>
+                        <a:t>TCP Uncaptured</a:t>
+                      </a:r>
+                    </a:p>
+                  </a:txBody>
+                  <a:tcPr marL="9525" marR="9525" marT="9525" marB="0" anchor="b"/>
+                </a:tc>
+                <a:tc>
+                  <a:txBody>
+                    <a:bodyPr/>
+                    <a:lstStyle/>
+                    <a:p>
+                      <a:endParaRPr lang="en-US" sz="900">
+                        <a:latin typeface="+mn-lt"/>
+                      </a:endParaRPr>
+                    </a:p>
+                  </a:txBody>
+                  <a:tcPr/>
+                </a:tc>
+                <a:tc>
+                  <a:txBody>
+                    <a:bodyPr/>
+                    <a:lstStyle/>
+                    <a:p>
+                      <a:r>
+                        <a:rPr lang="en-US" sz="900" dirty="0">
+                          <a:latin typeface="+mn-lt"/>
+                        </a:rPr>
+                        <a:t>TCP ACK</a:t>
+                      </a:r>
+                    </a:p>
+                  </a:txBody>
+                  <a:tcPr/>
+                </a:tc>
+                <a:extLst>
+                  <a:ext uri="{0D108BD9-81ED-4DB2-BD59-A6C34878D82A}">
+                    <a16:rowId xmlns:a16="http://schemas.microsoft.com/office/drawing/2014/main" val="1264549328"/>
+                  </a:ext>
+                </a:extLst>
+              </a:tr>
+              <a:tr h="358934">
+                <a:tc>
+                  <a:txBody>
+                    <a:bodyPr/>
+                    <a:lstStyle/>
+                    <a:p>
+                      <a:pPr algn="l" fontAlgn="b"/>
+                      <a:r>
+                        <a:rPr lang="en-US" sz="900" b="0" i="0" u="none" strike="noStrike" dirty="0">
+                          <a:solidFill>
+                            <a:srgbClr val="000000"/>
+                          </a:solidFill>
+                          <a:effectLst/>
+                          <a:latin typeface="+mn-lt"/>
+                        </a:rPr>
+                        <a:t>TCP unseen segment</a:t>
+                      </a:r>
+                    </a:p>
+                  </a:txBody>
+                  <a:tcPr marL="9525" marR="9525" marT="9525" marB="0" anchor="b"/>
+                </a:tc>
+                <a:tc>
+                  <a:txBody>
+                    <a:bodyPr/>
+                    <a:lstStyle/>
+                    <a:p>
+                      <a:endParaRPr lang="en-US" sz="900">
+                        <a:latin typeface="+mn-lt"/>
+                      </a:endParaRPr>
+                    </a:p>
+                  </a:txBody>
+                  <a:tcPr/>
+                </a:tc>
+                <a:tc>
+                  <a:txBody>
+                    <a:bodyPr/>
+                    <a:lstStyle/>
+                    <a:p>
+                      <a:r>
+                        <a:rPr lang="en-US" sz="900" dirty="0">
+                          <a:latin typeface="+mn-lt"/>
+                        </a:rPr>
+                        <a:t>TCP ACK</a:t>
+                      </a:r>
+                    </a:p>
+                  </a:txBody>
+                  <a:tcPr/>
+                </a:tc>
+                <a:extLst>
+                  <a:ext uri="{0D108BD9-81ED-4DB2-BD59-A6C34878D82A}">
+                    <a16:rowId xmlns:a16="http://schemas.microsoft.com/office/drawing/2014/main" val="823013732"/>
+                  </a:ext>
+                </a:extLst>
+              </a:tr>
+              <a:tr h="358934">
+                <a:tc>
+                  <a:txBody>
+                    <a:bodyPr/>
+                    <a:lstStyle/>
+                    <a:p>
+                      <a:pPr algn="l" fontAlgn="b"/>
+                      <a:r>
+                        <a:rPr lang="en-US" sz="900" b="0" i="0" u="none" strike="noStrike" dirty="0">
+                          <a:solidFill>
+                            <a:srgbClr val="000000"/>
+                          </a:solidFill>
+                          <a:effectLst/>
+                          <a:latin typeface="+mn-lt"/>
+                        </a:rPr>
+                        <a:t>TCP Window Update</a:t>
+                      </a:r>
+                    </a:p>
+                  </a:txBody>
+                  <a:tcPr marL="9525" marR="9525" marT="9525" marB="0" anchor="b"/>
+                </a:tc>
+                <a:tc>
+                  <a:txBody>
+                    <a:bodyPr/>
+                    <a:lstStyle/>
+                    <a:p>
+                      <a:endParaRPr lang="en-US" sz="900" dirty="0">
+                        <a:latin typeface="+mn-lt"/>
+                      </a:endParaRPr>
+                    </a:p>
+                  </a:txBody>
+                  <a:tcPr/>
+                </a:tc>
+                <a:tc>
+                  <a:txBody>
+                    <a:bodyPr/>
+                    <a:lstStyle/>
+                    <a:p>
+                      <a:r>
+                        <a:rPr lang="en-US" sz="900" dirty="0">
+                          <a:latin typeface="+mn-lt"/>
+                        </a:rPr>
+                        <a:t>TCP ACK</a:t>
+                      </a:r>
+                    </a:p>
+                  </a:txBody>
+                  <a:tcPr/>
+                </a:tc>
+                <a:extLst>
+                  <a:ext uri="{0D108BD9-81ED-4DB2-BD59-A6C34878D82A}">
+                    <a16:rowId xmlns:a16="http://schemas.microsoft.com/office/drawing/2014/main" val="3147046320"/>
+                  </a:ext>
+                </a:extLst>
+              </a:tr>
+              <a:tr h="358934">
+                <a:tc>
+                  <a:txBody>
+                    <a:bodyPr/>
+                    <a:lstStyle/>
+                    <a:p>
+                      <a:pPr algn="l" fontAlgn="b"/>
+                      <a:r>
+                        <a:rPr lang="en-US" sz="900" b="0" i="0" u="none" strike="noStrike" dirty="0">
+                          <a:solidFill>
+                            <a:srgbClr val="000000"/>
+                          </a:solidFill>
+                          <a:effectLst/>
+                          <a:latin typeface="+mn-lt"/>
+                        </a:rPr>
+                        <a:t>TLS Application Data</a:t>
+                      </a:r>
+                    </a:p>
+                  </a:txBody>
+                  <a:tcPr marL="9525" marR="9525" marT="9525" marB="0" anchor="b"/>
+                </a:tc>
+                <a:tc>
+                  <a:txBody>
+                    <a:bodyPr/>
+                    <a:lstStyle/>
                     <a:p>
                       <a:pPr marL="0" marR="0" lvl="0" indent="0" algn="l" defTabSz="914400" rtl="0" eaLnBrk="1" fontAlgn="auto" latinLnBrk="0" hangingPunct="1">
                         <a:lnSpc>
@@ -6261,6 +6333,35 @@
                           <a:effectLst/>
                           <a:latin typeface="+mn-lt"/>
                         </a:rPr>
+                        <a:t>TLS Encrypted Alert, TLS Uncaptured</a:t>
+                      </a:r>
+                    </a:p>
+                    <a:p>
+                      <a:pPr marL="0" marR="0" lvl="0" indent="0" algn="l" defTabSz="914400" rtl="0" eaLnBrk="1" fontAlgn="auto" latinLnBrk="0" hangingPunct="1">
+                        <a:lnSpc>
+                          <a:spcPct val="100000"/>
+                        </a:lnSpc>
+                        <a:spcBef>
+                          <a:spcPts val="0"/>
+                        </a:spcBef>
+                        <a:spcAft>
+                          <a:spcPts val="0"/>
+                        </a:spcAft>
+                        <a:buClrTx/>
+                        <a:buSzTx/>
+                        <a:buFontTx/>
+                        <a:buNone/>
+                        <a:tabLst/>
+                        <a:defRPr/>
+                      </a:pPr>
+                      <a:r>
+                        <a:rPr lang="en-US" sz="900" b="0" i="0" u="none" strike="noStrike" dirty="0">
+                          <a:solidFill>
+                            <a:srgbClr val="000000"/>
+                          </a:solidFill>
+                          <a:effectLst/>
+                          <a:latin typeface="+mn-lt"/>
+                        </a:rPr>
                         <a:t>TLS </a:t>
                       </a:r>
                       <a:r>
@@ -6281,7 +6382,7 @@
                           <a:effectLst/>
                           <a:latin typeface="+mn-lt"/>
                         </a:rPr>
-                        <a:t>, TLS Retransmit</a:t>
+                        <a:t>, TLS Retransmit, TLS Application Data, TCP CAM ACK, TCP DOM ACK</a:t>
                       </a:r>
                     </a:p>
                   </a:txBody>
@@ -6553,7 +6654,7 @@
                   </a:ext>
                 </a:extLst>
               </a:tr>
-              <a:tr h="358934">
+              <a:tr h="340018">
                 <a:tc>
                   <a:txBody>
                     <a:bodyPr/>
@@ -6619,7 +6720,7 @@
                         <a:rPr lang="en-US" sz="900" dirty="0">
                           <a:latin typeface="+mn-lt"/>
                         </a:rPr>
-                        <a:t>TCP ACK</a:t>
+                        <a:t>TCP CAM ACK</a:t>
                       </a:r>
                     </a:p>
                   </a:txBody>

</xml_diff>